<commit_message>
React + Redux Architecture
</commit_message>
<xml_diff>
--- a/TechPresentation.pptx
+++ b/TechPresentation.pptx
@@ -109,6 +109,11 @@
       </a:defRPr>
     </a:lvl9pPr>
   </p:defaultTextStyle>
+  <p:extLst>
+    <p:ext uri="{EFAFB233-063F-42B5-8137-9DF3F51BA10A}">
+      <p15:sldGuideLst xmlns:p15="http://schemas.microsoft.com/office/powerpoint/2012/main"/>
+    </p:ext>
+  </p:extLst>
 </p:presentation>
 </file>
 
@@ -3495,7 +3500,7 @@
         </p:nvSpPr>
         <p:spPr>
           <a:xfrm>
-            <a:off x="821094" y="1940767"/>
+            <a:off x="821094" y="2286010"/>
             <a:ext cx="2500604" cy="2892490"/>
           </a:xfrm>
           <a:prstGeom prst="rect">
@@ -3540,7 +3545,7 @@
         </p:nvSpPr>
         <p:spPr>
           <a:xfrm>
-            <a:off x="4845698" y="1940767"/>
+            <a:off x="4845698" y="2286010"/>
             <a:ext cx="2500604" cy="2892490"/>
           </a:xfrm>
           <a:prstGeom prst="rect">
@@ -3584,7 +3589,7 @@
         </p:nvSpPr>
         <p:spPr>
           <a:xfrm>
-            <a:off x="8870302" y="1940767"/>
+            <a:off x="8870302" y="2286010"/>
             <a:ext cx="2500604" cy="2892490"/>
           </a:xfrm>
           <a:prstGeom prst="rect">
@@ -3628,7 +3633,7 @@
         </p:nvSpPr>
         <p:spPr>
           <a:xfrm>
-            <a:off x="1074575" y="2006081"/>
+            <a:off x="1074575" y="2351324"/>
             <a:ext cx="2006082" cy="461665"/>
           </a:xfrm>
           <a:prstGeom prst="rect">
@@ -3664,7 +3669,7 @@
         </p:nvSpPr>
         <p:spPr>
           <a:xfrm>
-            <a:off x="5099179" y="2006081"/>
+            <a:off x="5099179" y="2351324"/>
             <a:ext cx="2006082" cy="461665"/>
           </a:xfrm>
           <a:prstGeom prst="rect">
@@ -3700,7 +3705,7 @@
         </p:nvSpPr>
         <p:spPr>
           <a:xfrm>
-            <a:off x="9117563" y="2006081"/>
+            <a:off x="9117563" y="2351324"/>
             <a:ext cx="2006082" cy="461665"/>
           </a:xfrm>
           <a:prstGeom prst="rect">
@@ -3736,7 +3741,7 @@
         </p:nvSpPr>
         <p:spPr>
           <a:xfrm>
-            <a:off x="1166326" y="4301412"/>
+            <a:off x="1166326" y="4646655"/>
             <a:ext cx="1791477" cy="369332"/>
           </a:xfrm>
           <a:prstGeom prst="rect">
@@ -3772,7 +3777,7 @@
         </p:nvSpPr>
         <p:spPr>
           <a:xfrm>
-            <a:off x="5200261" y="4301412"/>
+            <a:off x="5200261" y="4646655"/>
             <a:ext cx="1791477" cy="369332"/>
           </a:xfrm>
           <a:prstGeom prst="rect">
@@ -3808,7 +3813,7 @@
         </p:nvSpPr>
         <p:spPr>
           <a:xfrm>
-            <a:off x="9224865" y="4299466"/>
+            <a:off x="9224865" y="4644709"/>
             <a:ext cx="1791477" cy="369332"/>
           </a:xfrm>
           <a:prstGeom prst="rect">
@@ -3844,7 +3849,7 @@
         </p:nvSpPr>
         <p:spPr>
           <a:xfrm>
-            <a:off x="3175518" y="1343608"/>
+            <a:off x="3175518" y="1688851"/>
             <a:ext cx="1923661" cy="485278"/>
           </a:xfrm>
           <a:prstGeom prst="uturnArrow">
@@ -3898,7 +3903,7 @@
         </p:nvSpPr>
         <p:spPr>
           <a:xfrm rot="10800000">
-            <a:off x="3080657" y="4945138"/>
+            <a:off x="3080657" y="5290381"/>
             <a:ext cx="1923661" cy="485278"/>
           </a:xfrm>
           <a:prstGeom prst="uturnArrow">
@@ -3952,7 +3957,7 @@
         </p:nvSpPr>
         <p:spPr>
           <a:xfrm>
-            <a:off x="7417837" y="3195691"/>
+            <a:off x="7417837" y="3540934"/>
             <a:ext cx="1380930" cy="382641"/>
           </a:xfrm>
           <a:prstGeom prst="leftRightArrow">
@@ -3996,7 +4001,7 @@
         </p:nvSpPr>
         <p:spPr>
           <a:xfrm>
-            <a:off x="7147249" y="2690109"/>
+            <a:off x="7147249" y="3035352"/>
             <a:ext cx="1922107" cy="553998"/>
           </a:xfrm>
           <a:prstGeom prst="rect">
@@ -4039,7 +4044,7 @@
         </p:nvSpPr>
         <p:spPr>
           <a:xfrm>
-            <a:off x="7539134" y="3578332"/>
+            <a:off x="7539134" y="3923575"/>
             <a:ext cx="1138335" cy="369332"/>
           </a:xfrm>
           <a:prstGeom prst="rect">
@@ -4075,7 +4080,7 @@
         </p:nvSpPr>
         <p:spPr>
           <a:xfrm>
-            <a:off x="945501" y="3094623"/>
+            <a:off x="945501" y="3439866"/>
             <a:ext cx="2251789" cy="584775"/>
           </a:xfrm>
           <a:prstGeom prst="rect">
@@ -4118,7 +4123,7 @@
         </p:nvSpPr>
         <p:spPr>
           <a:xfrm>
-            <a:off x="4973215" y="3008902"/>
+            <a:off x="4973215" y="3354145"/>
             <a:ext cx="2251789" cy="830997"/>
           </a:xfrm>
           <a:prstGeom prst="rect">
@@ -4168,7 +4173,7 @@
         </p:nvSpPr>
         <p:spPr>
           <a:xfrm>
-            <a:off x="9016483" y="3255123"/>
+            <a:off x="9016483" y="3600366"/>
             <a:ext cx="2251789" cy="338554"/>
           </a:xfrm>
           <a:prstGeom prst="rect">
@@ -4204,7 +4209,7 @@
         </p:nvSpPr>
         <p:spPr>
           <a:xfrm>
-            <a:off x="3363684" y="945445"/>
+            <a:off x="3363684" y="1290688"/>
             <a:ext cx="1547328" cy="369332"/>
           </a:xfrm>
           <a:prstGeom prst="rect">
@@ -4240,7 +4245,7 @@
         </p:nvSpPr>
         <p:spPr>
           <a:xfrm>
-            <a:off x="3041001" y="5488126"/>
+            <a:off x="3041001" y="5833369"/>
             <a:ext cx="2002971" cy="369332"/>
           </a:xfrm>
           <a:prstGeom prst="rect">
@@ -4306,8 +4311,8 @@
         </p:nvSpPr>
         <p:spPr>
           <a:xfrm>
-            <a:off x="401217" y="248789"/>
-            <a:ext cx="6671388" cy="584775"/>
+            <a:off x="401216" y="248789"/>
+            <a:ext cx="9349273" cy="584775"/>
           </a:xfrm>
           <a:prstGeom prst="rect">
             <a:avLst/>
@@ -4322,7 +4327,1638 @@
           <a:p>
             <a:r>
               <a:rPr lang="en-US" sz="3200" b="1" dirty="0"/>
-              <a:t>123456</a:t>
+              <a:t>React + Redux Architecture </a:t>
+            </a:r>
+            <a:r>
+              <a:rPr lang="en-US" altLang="zh-CN" sz="3200" b="1" dirty="0"/>
+              <a:t>— Create a business</a:t>
+            </a:r>
+            <a:endParaRPr lang="en-US" sz="3200" b="1" dirty="0"/>
+          </a:p>
+        </p:txBody>
+      </p:sp>
+      <p:sp>
+        <p:nvSpPr>
+          <p:cNvPr id="2" name="Rectangle: Rounded Corners 1">
+            <a:extLst>
+              <a:ext uri="{FF2B5EF4-FFF2-40B4-BE49-F238E27FC236}">
+                <a16:creationId xmlns:a16="http://schemas.microsoft.com/office/drawing/2014/main" id="{C797A3EB-B2E6-47F4-AE3F-4B142C0FDF43}"/>
+              </a:ext>
+            </a:extLst>
+          </p:cNvPr>
+          <p:cNvSpPr/>
+          <p:nvPr/>
+        </p:nvSpPr>
+        <p:spPr>
+          <a:xfrm>
+            <a:off x="401216" y="2934484"/>
+            <a:ext cx="1707502" cy="1306286"/>
+          </a:xfrm>
+          <a:prstGeom prst="roundRect">
+            <a:avLst/>
+          </a:prstGeom>
+          <a:gradFill flip="none" rotWithShape="1">
+            <a:gsLst>
+              <a:gs pos="0">
+                <a:schemeClr val="accent4">
+                  <a:lumMod val="110000"/>
+                  <a:satMod val="105000"/>
+                  <a:tint val="67000"/>
+                </a:schemeClr>
+              </a:gs>
+              <a:gs pos="50000">
+                <a:schemeClr val="accent4">
+                  <a:lumMod val="105000"/>
+                  <a:satMod val="103000"/>
+                  <a:tint val="73000"/>
+                </a:schemeClr>
+              </a:gs>
+              <a:gs pos="100000">
+                <a:schemeClr val="accent4">
+                  <a:lumMod val="105000"/>
+                  <a:satMod val="109000"/>
+                  <a:tint val="81000"/>
+                </a:schemeClr>
+              </a:gs>
+            </a:gsLst>
+            <a:lin ang="16200000" scaled="1"/>
+            <a:tileRect/>
+          </a:gradFill>
+          <a:ln w="38100"/>
+        </p:spPr>
+        <p:style>
+          <a:lnRef idx="1">
+            <a:schemeClr val="accent4"/>
+          </a:lnRef>
+          <a:fillRef idx="2">
+            <a:schemeClr val="accent4"/>
+          </a:fillRef>
+          <a:effectRef idx="1">
+            <a:schemeClr val="accent4"/>
+          </a:effectRef>
+          <a:fontRef idx="minor">
+            <a:schemeClr val="dk1"/>
+          </a:fontRef>
+        </p:style>
+        <p:txBody>
+          <a:bodyPr rtlCol="0" anchor="ctr"/>
+          <a:lstStyle/>
+          <a:p>
+            <a:pPr algn="ctr"/>
+            <a:endParaRPr lang="en-US"/>
+          </a:p>
+        </p:txBody>
+      </p:sp>
+      <p:sp>
+        <p:nvSpPr>
+          <p:cNvPr id="3" name="Rectangle: Rounded Corners 2">
+            <a:extLst>
+              <a:ext uri="{FF2B5EF4-FFF2-40B4-BE49-F238E27FC236}">
+                <a16:creationId xmlns:a16="http://schemas.microsoft.com/office/drawing/2014/main" id="{50D6B40E-C80A-4C2D-885F-96D5E093E0A1}"/>
+              </a:ext>
+            </a:extLst>
+          </p:cNvPr>
+          <p:cNvSpPr/>
+          <p:nvPr/>
+        </p:nvSpPr>
+        <p:spPr>
+          <a:xfrm>
+            <a:off x="3013786" y="3158418"/>
+            <a:ext cx="1623527" cy="1027488"/>
+          </a:xfrm>
+          <a:prstGeom prst="roundRect">
+            <a:avLst/>
+          </a:prstGeom>
+          <a:ln w="38100"/>
+        </p:spPr>
+        <p:style>
+          <a:lnRef idx="1">
+            <a:schemeClr val="accent5"/>
+          </a:lnRef>
+          <a:fillRef idx="2">
+            <a:schemeClr val="accent5"/>
+          </a:fillRef>
+          <a:effectRef idx="1">
+            <a:schemeClr val="accent5"/>
+          </a:effectRef>
+          <a:fontRef idx="minor">
+            <a:schemeClr val="dk1"/>
+          </a:fontRef>
+        </p:style>
+        <p:txBody>
+          <a:bodyPr rtlCol="0" anchor="ctr"/>
+          <a:lstStyle/>
+          <a:p>
+            <a:pPr algn="ctr"/>
+            <a:endParaRPr lang="en-US" dirty="0"/>
+          </a:p>
+        </p:txBody>
+      </p:sp>
+      <p:sp>
+        <p:nvSpPr>
+          <p:cNvPr id="5" name="Rectangle: Rounded Corners 4">
+            <a:extLst>
+              <a:ext uri="{FF2B5EF4-FFF2-40B4-BE49-F238E27FC236}">
+                <a16:creationId xmlns:a16="http://schemas.microsoft.com/office/drawing/2014/main" id="{963B50EB-0893-4A43-8EB1-3C92415C242B}"/>
+              </a:ext>
+            </a:extLst>
+          </p:cNvPr>
+          <p:cNvSpPr/>
+          <p:nvPr/>
+        </p:nvSpPr>
+        <p:spPr>
+          <a:xfrm>
+            <a:off x="2967132" y="1086175"/>
+            <a:ext cx="1716834" cy="584775"/>
+          </a:xfrm>
+          <a:prstGeom prst="roundRect">
+            <a:avLst/>
+          </a:prstGeom>
+          <a:ln w="38100"/>
+        </p:spPr>
+        <p:style>
+          <a:lnRef idx="1">
+            <a:schemeClr val="dk1"/>
+          </a:lnRef>
+          <a:fillRef idx="2">
+            <a:schemeClr val="dk1"/>
+          </a:fillRef>
+          <a:effectRef idx="1">
+            <a:schemeClr val="dk1"/>
+          </a:effectRef>
+          <a:fontRef idx="minor">
+            <a:schemeClr val="dk1"/>
+          </a:fontRef>
+        </p:style>
+        <p:txBody>
+          <a:bodyPr rtlCol="0" anchor="ctr"/>
+          <a:lstStyle/>
+          <a:p>
+            <a:pPr algn="ctr"/>
+            <a:endParaRPr lang="en-US"/>
+          </a:p>
+        </p:txBody>
+      </p:sp>
+      <p:sp>
+        <p:nvSpPr>
+          <p:cNvPr id="6" name="Diamond 5">
+            <a:extLst>
+              <a:ext uri="{FF2B5EF4-FFF2-40B4-BE49-F238E27FC236}">
+                <a16:creationId xmlns:a16="http://schemas.microsoft.com/office/drawing/2014/main" id="{B7D0F105-7B52-4076-954A-A70597BC7865}"/>
+              </a:ext>
+            </a:extLst>
+          </p:cNvPr>
+          <p:cNvSpPr/>
+          <p:nvPr/>
+        </p:nvSpPr>
+        <p:spPr>
+          <a:xfrm>
+            <a:off x="6069562" y="3220196"/>
+            <a:ext cx="1623527" cy="858417"/>
+          </a:xfrm>
+          <a:prstGeom prst="diamond">
+            <a:avLst/>
+          </a:prstGeom>
+          <a:solidFill>
+            <a:schemeClr val="bg1">
+              <a:lumMod val="85000"/>
+            </a:schemeClr>
+          </a:solidFill>
+          <a:ln w="38100">
+            <a:noFill/>
+          </a:ln>
+        </p:spPr>
+        <p:style>
+          <a:lnRef idx="1">
+            <a:schemeClr val="accent2"/>
+          </a:lnRef>
+          <a:fillRef idx="2">
+            <a:schemeClr val="accent2"/>
+          </a:fillRef>
+          <a:effectRef idx="1">
+            <a:schemeClr val="accent2"/>
+          </a:effectRef>
+          <a:fontRef idx="minor">
+            <a:schemeClr val="dk1"/>
+          </a:fontRef>
+        </p:style>
+        <p:txBody>
+          <a:bodyPr rtlCol="0" anchor="ctr"/>
+          <a:lstStyle/>
+          <a:p>
+            <a:pPr algn="ctr"/>
+            <a:endParaRPr lang="en-US"/>
+          </a:p>
+        </p:txBody>
+      </p:sp>
+      <p:sp>
+        <p:nvSpPr>
+          <p:cNvPr id="7" name="Rectangle: Rounded Corners 6">
+            <a:extLst>
+              <a:ext uri="{FF2B5EF4-FFF2-40B4-BE49-F238E27FC236}">
+                <a16:creationId xmlns:a16="http://schemas.microsoft.com/office/drawing/2014/main" id="{44DFEFEC-A851-4A96-844D-C006D03E90B7}"/>
+              </a:ext>
+            </a:extLst>
+          </p:cNvPr>
+          <p:cNvSpPr/>
+          <p:nvPr/>
+        </p:nvSpPr>
+        <p:spPr>
+          <a:xfrm>
+            <a:off x="6027575" y="992191"/>
+            <a:ext cx="1707502" cy="835938"/>
+          </a:xfrm>
+          <a:prstGeom prst="roundRect">
+            <a:avLst/>
+          </a:prstGeom>
+          <a:gradFill flip="none" rotWithShape="1">
+            <a:gsLst>
+              <a:gs pos="0">
+                <a:schemeClr val="accent4">
+                  <a:lumMod val="110000"/>
+                  <a:satMod val="105000"/>
+                  <a:tint val="67000"/>
+                </a:schemeClr>
+              </a:gs>
+              <a:gs pos="50000">
+                <a:schemeClr val="accent4">
+                  <a:lumMod val="105000"/>
+                  <a:satMod val="103000"/>
+                  <a:tint val="73000"/>
+                </a:schemeClr>
+              </a:gs>
+              <a:gs pos="100000">
+                <a:schemeClr val="accent4">
+                  <a:lumMod val="105000"/>
+                  <a:satMod val="109000"/>
+                  <a:tint val="81000"/>
+                </a:schemeClr>
+              </a:gs>
+            </a:gsLst>
+            <a:lin ang="16200000" scaled="1"/>
+            <a:tileRect/>
+          </a:gradFill>
+          <a:ln w="38100"/>
+        </p:spPr>
+        <p:style>
+          <a:lnRef idx="1">
+            <a:schemeClr val="accent4"/>
+          </a:lnRef>
+          <a:fillRef idx="2">
+            <a:schemeClr val="accent4"/>
+          </a:fillRef>
+          <a:effectRef idx="1">
+            <a:schemeClr val="accent4"/>
+          </a:effectRef>
+          <a:fontRef idx="minor">
+            <a:schemeClr val="dk1"/>
+          </a:fontRef>
+        </p:style>
+        <p:txBody>
+          <a:bodyPr rtlCol="0" anchor="ctr"/>
+          <a:lstStyle/>
+          <a:p>
+            <a:pPr algn="ctr"/>
+            <a:endParaRPr lang="en-US" dirty="0"/>
+          </a:p>
+        </p:txBody>
+      </p:sp>
+      <p:sp>
+        <p:nvSpPr>
+          <p:cNvPr id="8" name="Rectangle: Rounded Corners 7">
+            <a:extLst>
+              <a:ext uri="{FF2B5EF4-FFF2-40B4-BE49-F238E27FC236}">
+                <a16:creationId xmlns:a16="http://schemas.microsoft.com/office/drawing/2014/main" id="{1CE091FD-65C0-4654-BB29-1863A89A1507}"/>
+              </a:ext>
+            </a:extLst>
+          </p:cNvPr>
+          <p:cNvSpPr/>
+          <p:nvPr/>
+        </p:nvSpPr>
+        <p:spPr>
+          <a:xfrm>
+            <a:off x="9330620" y="2300000"/>
+            <a:ext cx="1623528" cy="858418"/>
+          </a:xfrm>
+          <a:prstGeom prst="roundRect">
+            <a:avLst/>
+          </a:prstGeom>
+          <a:gradFill flip="none" rotWithShape="1">
+            <a:gsLst>
+              <a:gs pos="0">
+                <a:schemeClr val="accent6">
+                  <a:lumMod val="40000"/>
+                  <a:lumOff val="60000"/>
+                  <a:tint val="66000"/>
+                  <a:satMod val="160000"/>
+                </a:schemeClr>
+              </a:gs>
+              <a:gs pos="50000">
+                <a:schemeClr val="accent6">
+                  <a:lumMod val="40000"/>
+                  <a:lumOff val="60000"/>
+                  <a:tint val="44500"/>
+                  <a:satMod val="160000"/>
+                </a:schemeClr>
+              </a:gs>
+              <a:gs pos="100000">
+                <a:schemeClr val="accent6">
+                  <a:lumMod val="40000"/>
+                  <a:lumOff val="60000"/>
+                  <a:tint val="23500"/>
+                  <a:satMod val="160000"/>
+                </a:schemeClr>
+              </a:gs>
+            </a:gsLst>
+            <a:lin ang="5400000" scaled="1"/>
+            <a:tileRect/>
+          </a:gradFill>
+          <a:ln w="38100"/>
+        </p:spPr>
+        <p:style>
+          <a:lnRef idx="1">
+            <a:schemeClr val="accent6"/>
+          </a:lnRef>
+          <a:fillRef idx="2">
+            <a:schemeClr val="accent6"/>
+          </a:fillRef>
+          <a:effectRef idx="1">
+            <a:schemeClr val="accent6"/>
+          </a:effectRef>
+          <a:fontRef idx="minor">
+            <a:schemeClr val="dk1"/>
+          </a:fontRef>
+        </p:style>
+        <p:txBody>
+          <a:bodyPr rtlCol="0" anchor="ctr"/>
+          <a:lstStyle/>
+          <a:p>
+            <a:pPr algn="ctr"/>
+            <a:endParaRPr lang="en-US"/>
+          </a:p>
+        </p:txBody>
+      </p:sp>
+      <p:sp>
+        <p:nvSpPr>
+          <p:cNvPr id="9" name="Rectangle: Rounded Corners 8">
+            <a:extLst>
+              <a:ext uri="{FF2B5EF4-FFF2-40B4-BE49-F238E27FC236}">
+                <a16:creationId xmlns:a16="http://schemas.microsoft.com/office/drawing/2014/main" id="{123DE055-9E8B-4B57-A16D-80B1EAD47E23}"/>
+              </a:ext>
+            </a:extLst>
+          </p:cNvPr>
+          <p:cNvSpPr/>
+          <p:nvPr/>
+        </p:nvSpPr>
+        <p:spPr>
+          <a:xfrm>
+            <a:off x="9283959" y="4749288"/>
+            <a:ext cx="2537927" cy="1716833"/>
+          </a:xfrm>
+          <a:prstGeom prst="roundRect">
+            <a:avLst/>
+          </a:prstGeom>
+          <a:gradFill flip="none" rotWithShape="1">
+            <a:gsLst>
+              <a:gs pos="0">
+                <a:srgbClr val="7030A0">
+                  <a:tint val="66000"/>
+                  <a:satMod val="160000"/>
+                </a:srgbClr>
+              </a:gs>
+              <a:gs pos="50000">
+                <a:srgbClr val="7030A0">
+                  <a:tint val="44500"/>
+                  <a:satMod val="160000"/>
+                </a:srgbClr>
+              </a:gs>
+              <a:gs pos="100000">
+                <a:srgbClr val="7030A0">
+                  <a:tint val="23500"/>
+                  <a:satMod val="160000"/>
+                </a:srgbClr>
+              </a:gs>
+            </a:gsLst>
+            <a:path path="circle">
+              <a:fillToRect r="100000" b="100000"/>
+            </a:path>
+            <a:tileRect l="-100000" t="-100000"/>
+          </a:gradFill>
+          <a:ln w="38100"/>
+        </p:spPr>
+        <p:style>
+          <a:lnRef idx="2">
+            <a:schemeClr val="accent1">
+              <a:shade val="50000"/>
+            </a:schemeClr>
+          </a:lnRef>
+          <a:fillRef idx="1">
+            <a:schemeClr val="accent1"/>
+          </a:fillRef>
+          <a:effectRef idx="0">
+            <a:schemeClr val="accent1"/>
+          </a:effectRef>
+          <a:fontRef idx="minor">
+            <a:schemeClr val="lt1"/>
+          </a:fontRef>
+        </p:style>
+        <p:txBody>
+          <a:bodyPr rtlCol="0" anchor="ctr"/>
+          <a:lstStyle/>
+          <a:p>
+            <a:pPr algn="ctr"/>
+            <a:endParaRPr lang="en-US"/>
+          </a:p>
+        </p:txBody>
+      </p:sp>
+      <p:sp>
+        <p:nvSpPr>
+          <p:cNvPr id="10" name="Rectangle: Rounded Corners 9">
+            <a:extLst>
+              <a:ext uri="{FF2B5EF4-FFF2-40B4-BE49-F238E27FC236}">
+                <a16:creationId xmlns:a16="http://schemas.microsoft.com/office/drawing/2014/main" id="{C7C6A1CB-9984-4C0A-B1AC-014321D00DE2}"/>
+              </a:ext>
+            </a:extLst>
+          </p:cNvPr>
+          <p:cNvSpPr/>
+          <p:nvPr/>
+        </p:nvSpPr>
+        <p:spPr>
+          <a:xfrm>
+            <a:off x="2830286" y="4989481"/>
+            <a:ext cx="4344955" cy="1452466"/>
+          </a:xfrm>
+          <a:prstGeom prst="roundRect">
+            <a:avLst/>
+          </a:prstGeom>
+          <a:solidFill>
+            <a:schemeClr val="bg1">
+              <a:lumMod val="85000"/>
+            </a:schemeClr>
+          </a:solidFill>
+          <a:ln>
+            <a:noFill/>
+          </a:ln>
+        </p:spPr>
+        <p:style>
+          <a:lnRef idx="2">
+            <a:schemeClr val="accent1">
+              <a:shade val="50000"/>
+            </a:schemeClr>
+          </a:lnRef>
+          <a:fillRef idx="1">
+            <a:schemeClr val="accent1"/>
+          </a:fillRef>
+          <a:effectRef idx="0">
+            <a:schemeClr val="accent1"/>
+          </a:effectRef>
+          <a:fontRef idx="minor">
+            <a:schemeClr val="lt1"/>
+          </a:fontRef>
+        </p:style>
+        <p:txBody>
+          <a:bodyPr rtlCol="0" anchor="ctr"/>
+          <a:lstStyle/>
+          <a:p>
+            <a:pPr algn="ctr"/>
+            <a:endParaRPr lang="en-US"/>
+          </a:p>
+        </p:txBody>
+      </p:sp>
+      <p:sp>
+        <p:nvSpPr>
+          <p:cNvPr id="11" name="TextBox 10">
+            <a:extLst>
+              <a:ext uri="{FF2B5EF4-FFF2-40B4-BE49-F238E27FC236}">
+                <a16:creationId xmlns:a16="http://schemas.microsoft.com/office/drawing/2014/main" id="{2AAFB746-7382-4822-919E-9030CA998E6C}"/>
+              </a:ext>
+            </a:extLst>
+          </p:cNvPr>
+          <p:cNvSpPr txBox="1"/>
+          <p:nvPr/>
+        </p:nvSpPr>
+        <p:spPr>
+          <a:xfrm>
+            <a:off x="467696" y="3202905"/>
+            <a:ext cx="1537218" cy="769441"/>
+          </a:xfrm>
+          <a:prstGeom prst="rect">
+            <a:avLst/>
+          </a:prstGeom>
+          <a:noFill/>
+        </p:spPr>
+        <p:txBody>
+          <a:bodyPr wrap="square" rtlCol="0">
+            <a:spAutoFit/>
+          </a:bodyPr>
+          <a:lstStyle/>
+          <a:p>
+            <a:pPr algn="ctr"/>
+            <a:r>
+              <a:rPr lang="en-US" sz="1600" dirty="0"/>
+              <a:t>Create Form</a:t>
+            </a:r>
+          </a:p>
+          <a:p>
+            <a:pPr algn="ctr"/>
+            <a:endParaRPr lang="en-US" sz="1400" dirty="0"/>
+          </a:p>
+          <a:p>
+            <a:pPr algn="ctr"/>
+            <a:r>
+              <a:rPr lang="en-US" sz="1400" dirty="0"/>
+              <a:t>React component</a:t>
+            </a:r>
+          </a:p>
+        </p:txBody>
+      </p:sp>
+      <p:sp>
+        <p:nvSpPr>
+          <p:cNvPr id="12" name="Arrow: Right 11">
+            <a:extLst>
+              <a:ext uri="{FF2B5EF4-FFF2-40B4-BE49-F238E27FC236}">
+                <a16:creationId xmlns:a16="http://schemas.microsoft.com/office/drawing/2014/main" id="{7336881E-4679-4FA9-B7EC-4E9FACF944CE}"/>
+              </a:ext>
+            </a:extLst>
+          </p:cNvPr>
+          <p:cNvSpPr/>
+          <p:nvPr/>
+        </p:nvSpPr>
+        <p:spPr>
+          <a:xfrm>
+            <a:off x="2183363" y="3587625"/>
+            <a:ext cx="726619" cy="153957"/>
+          </a:xfrm>
+          <a:prstGeom prst="rightArrow">
+            <a:avLst/>
+          </a:prstGeom>
+          <a:solidFill>
+            <a:schemeClr val="bg1">
+              <a:lumMod val="85000"/>
+            </a:schemeClr>
+          </a:solidFill>
+          <a:ln>
+            <a:noFill/>
+          </a:ln>
+        </p:spPr>
+        <p:style>
+          <a:lnRef idx="2">
+            <a:schemeClr val="accent1">
+              <a:shade val="50000"/>
+            </a:schemeClr>
+          </a:lnRef>
+          <a:fillRef idx="1">
+            <a:schemeClr val="accent1"/>
+          </a:fillRef>
+          <a:effectRef idx="0">
+            <a:schemeClr val="accent1"/>
+          </a:effectRef>
+          <a:fontRef idx="minor">
+            <a:schemeClr val="lt1"/>
+          </a:fontRef>
+        </p:style>
+        <p:txBody>
+          <a:bodyPr rtlCol="0" anchor="ctr"/>
+          <a:lstStyle/>
+          <a:p>
+            <a:pPr algn="ctr"/>
+            <a:endParaRPr lang="en-US"/>
+          </a:p>
+        </p:txBody>
+      </p:sp>
+      <p:sp>
+        <p:nvSpPr>
+          <p:cNvPr id="13" name="Arrow: Right 12">
+            <a:extLst>
+              <a:ext uri="{FF2B5EF4-FFF2-40B4-BE49-F238E27FC236}">
+                <a16:creationId xmlns:a16="http://schemas.microsoft.com/office/drawing/2014/main" id="{47E337F0-00B9-4366-8C85-167341795A30}"/>
+              </a:ext>
+            </a:extLst>
+          </p:cNvPr>
+          <p:cNvSpPr/>
+          <p:nvPr/>
+        </p:nvSpPr>
+        <p:spPr>
+          <a:xfrm rot="16200000">
+            <a:off x="2801515" y="2373732"/>
+            <a:ext cx="1306286" cy="144628"/>
+          </a:xfrm>
+          <a:prstGeom prst="rightArrow">
+            <a:avLst/>
+          </a:prstGeom>
+          <a:solidFill>
+            <a:schemeClr val="bg1">
+              <a:lumMod val="85000"/>
+            </a:schemeClr>
+          </a:solidFill>
+          <a:ln>
+            <a:noFill/>
+          </a:ln>
+        </p:spPr>
+        <p:style>
+          <a:lnRef idx="2">
+            <a:schemeClr val="accent1">
+              <a:shade val="50000"/>
+            </a:schemeClr>
+          </a:lnRef>
+          <a:fillRef idx="1">
+            <a:schemeClr val="accent1"/>
+          </a:fillRef>
+          <a:effectRef idx="0">
+            <a:schemeClr val="accent1"/>
+          </a:effectRef>
+          <a:fontRef idx="minor">
+            <a:schemeClr val="lt1"/>
+          </a:fontRef>
+        </p:style>
+        <p:txBody>
+          <a:bodyPr rtlCol="0" anchor="ctr"/>
+          <a:lstStyle/>
+          <a:p>
+            <a:pPr algn="ctr"/>
+            <a:endParaRPr lang="en-US"/>
+          </a:p>
+        </p:txBody>
+      </p:sp>
+      <p:sp>
+        <p:nvSpPr>
+          <p:cNvPr id="14" name="Arrow: Right 13">
+            <a:extLst>
+              <a:ext uri="{FF2B5EF4-FFF2-40B4-BE49-F238E27FC236}">
+                <a16:creationId xmlns:a16="http://schemas.microsoft.com/office/drawing/2014/main" id="{44E83CD4-4829-4EF6-9943-4DA8FCA206B3}"/>
+              </a:ext>
+            </a:extLst>
+          </p:cNvPr>
+          <p:cNvSpPr/>
+          <p:nvPr/>
+        </p:nvSpPr>
+        <p:spPr>
+          <a:xfrm rot="5400000">
+            <a:off x="3503641" y="2373731"/>
+            <a:ext cx="1306286" cy="144628"/>
+          </a:xfrm>
+          <a:prstGeom prst="rightArrow">
+            <a:avLst/>
+          </a:prstGeom>
+          <a:solidFill>
+            <a:schemeClr val="bg1">
+              <a:lumMod val="85000"/>
+            </a:schemeClr>
+          </a:solidFill>
+          <a:ln>
+            <a:noFill/>
+          </a:ln>
+        </p:spPr>
+        <p:style>
+          <a:lnRef idx="2">
+            <a:schemeClr val="accent1">
+              <a:shade val="50000"/>
+            </a:schemeClr>
+          </a:lnRef>
+          <a:fillRef idx="1">
+            <a:schemeClr val="accent1"/>
+          </a:fillRef>
+          <a:effectRef idx="0">
+            <a:schemeClr val="accent1"/>
+          </a:effectRef>
+          <a:fontRef idx="minor">
+            <a:schemeClr val="lt1"/>
+          </a:fontRef>
+        </p:style>
+        <p:txBody>
+          <a:bodyPr rtlCol="0" anchor="ctr"/>
+          <a:lstStyle/>
+          <a:p>
+            <a:pPr algn="ctr"/>
+            <a:endParaRPr lang="en-US"/>
+          </a:p>
+        </p:txBody>
+      </p:sp>
+      <p:sp>
+        <p:nvSpPr>
+          <p:cNvPr id="15" name="Arrow: Right 14">
+            <a:extLst>
+              <a:ext uri="{FF2B5EF4-FFF2-40B4-BE49-F238E27FC236}">
+                <a16:creationId xmlns:a16="http://schemas.microsoft.com/office/drawing/2014/main" id="{57D86215-37C7-4CA2-B954-26E02DCC6117}"/>
+              </a:ext>
+            </a:extLst>
+          </p:cNvPr>
+          <p:cNvSpPr/>
+          <p:nvPr/>
+        </p:nvSpPr>
+        <p:spPr>
+          <a:xfrm>
+            <a:off x="4712542" y="3587625"/>
+            <a:ext cx="1357020" cy="153956"/>
+          </a:xfrm>
+          <a:prstGeom prst="rightArrow">
+            <a:avLst/>
+          </a:prstGeom>
+          <a:solidFill>
+            <a:schemeClr val="bg1">
+              <a:lumMod val="85000"/>
+            </a:schemeClr>
+          </a:solidFill>
+          <a:ln>
+            <a:noFill/>
+          </a:ln>
+        </p:spPr>
+        <p:style>
+          <a:lnRef idx="2">
+            <a:schemeClr val="accent1">
+              <a:shade val="50000"/>
+            </a:schemeClr>
+          </a:lnRef>
+          <a:fillRef idx="1">
+            <a:schemeClr val="accent1"/>
+          </a:fillRef>
+          <a:effectRef idx="0">
+            <a:schemeClr val="accent1"/>
+          </a:effectRef>
+          <a:fontRef idx="minor">
+            <a:schemeClr val="lt1"/>
+          </a:fontRef>
+        </p:style>
+        <p:txBody>
+          <a:bodyPr rtlCol="0" anchor="ctr"/>
+          <a:lstStyle/>
+          <a:p>
+            <a:pPr algn="ctr"/>
+            <a:endParaRPr lang="en-US"/>
+          </a:p>
+        </p:txBody>
+      </p:sp>
+      <p:sp>
+        <p:nvSpPr>
+          <p:cNvPr id="16" name="Arrow: Right 15">
+            <a:extLst>
+              <a:ext uri="{FF2B5EF4-FFF2-40B4-BE49-F238E27FC236}">
+                <a16:creationId xmlns:a16="http://schemas.microsoft.com/office/drawing/2014/main" id="{D70A6051-BD5A-404E-AC95-8F9DBE9067FA}"/>
+              </a:ext>
+            </a:extLst>
+          </p:cNvPr>
+          <p:cNvSpPr/>
+          <p:nvPr/>
+        </p:nvSpPr>
+        <p:spPr>
+          <a:xfrm rot="16200000">
+            <a:off x="6228188" y="2482006"/>
+            <a:ext cx="1292303" cy="144629"/>
+          </a:xfrm>
+          <a:prstGeom prst="rightArrow">
+            <a:avLst/>
+          </a:prstGeom>
+          <a:solidFill>
+            <a:schemeClr val="bg1">
+              <a:lumMod val="85000"/>
+            </a:schemeClr>
+          </a:solidFill>
+          <a:ln>
+            <a:noFill/>
+          </a:ln>
+        </p:spPr>
+        <p:style>
+          <a:lnRef idx="2">
+            <a:schemeClr val="accent1">
+              <a:shade val="50000"/>
+            </a:schemeClr>
+          </a:lnRef>
+          <a:fillRef idx="1">
+            <a:schemeClr val="accent1"/>
+          </a:fillRef>
+          <a:effectRef idx="0">
+            <a:schemeClr val="accent1"/>
+          </a:effectRef>
+          <a:fontRef idx="minor">
+            <a:schemeClr val="lt1"/>
+          </a:fontRef>
+        </p:style>
+        <p:txBody>
+          <a:bodyPr rtlCol="0" anchor="ctr"/>
+          <a:lstStyle/>
+          <a:p>
+            <a:pPr algn="ctr"/>
+            <a:endParaRPr lang="en-US"/>
+          </a:p>
+        </p:txBody>
+      </p:sp>
+      <p:sp>
+        <p:nvSpPr>
+          <p:cNvPr id="17" name="Arrow: Bent-Up 16">
+            <a:extLst>
+              <a:ext uri="{FF2B5EF4-FFF2-40B4-BE49-F238E27FC236}">
+                <a16:creationId xmlns:a16="http://schemas.microsoft.com/office/drawing/2014/main" id="{047835E5-73E4-469D-8D24-923B6CD5A68E}"/>
+              </a:ext>
+            </a:extLst>
+          </p:cNvPr>
+          <p:cNvSpPr/>
+          <p:nvPr/>
+        </p:nvSpPr>
+        <p:spPr>
+          <a:xfrm>
+            <a:off x="7735077" y="3220195"/>
+            <a:ext cx="2015412" cy="465555"/>
+          </a:xfrm>
+          <a:prstGeom prst="bentUpArrow">
+            <a:avLst>
+              <a:gd name="adj1" fmla="val 19702"/>
+              <a:gd name="adj2" fmla="val 31851"/>
+              <a:gd name="adj3" fmla="val 33633"/>
+            </a:avLst>
+          </a:prstGeom>
+          <a:solidFill>
+            <a:schemeClr val="bg1">
+              <a:lumMod val="85000"/>
+            </a:schemeClr>
+          </a:solidFill>
+          <a:ln>
+            <a:noFill/>
+          </a:ln>
+        </p:spPr>
+        <p:style>
+          <a:lnRef idx="2">
+            <a:schemeClr val="accent1">
+              <a:shade val="50000"/>
+            </a:schemeClr>
+          </a:lnRef>
+          <a:fillRef idx="1">
+            <a:schemeClr val="accent1"/>
+          </a:fillRef>
+          <a:effectRef idx="0">
+            <a:schemeClr val="accent1"/>
+          </a:effectRef>
+          <a:fontRef idx="minor">
+            <a:schemeClr val="lt1"/>
+          </a:fontRef>
+        </p:style>
+        <p:txBody>
+          <a:bodyPr rtlCol="0" anchor="ctr"/>
+          <a:lstStyle/>
+          <a:p>
+            <a:pPr algn="ctr"/>
+            <a:endParaRPr lang="en-US"/>
+          </a:p>
+        </p:txBody>
+      </p:sp>
+      <p:sp>
+        <p:nvSpPr>
+          <p:cNvPr id="18" name="Arrow: Right 17">
+            <a:extLst>
+              <a:ext uri="{FF2B5EF4-FFF2-40B4-BE49-F238E27FC236}">
+                <a16:creationId xmlns:a16="http://schemas.microsoft.com/office/drawing/2014/main" id="{C3F8407E-9892-4A93-8B7B-6716DA7A96FE}"/>
+              </a:ext>
+            </a:extLst>
+          </p:cNvPr>
+          <p:cNvSpPr/>
+          <p:nvPr/>
+        </p:nvSpPr>
+        <p:spPr>
+          <a:xfrm rot="5400000">
+            <a:off x="9391377" y="3849000"/>
+            <a:ext cx="1441344" cy="172620"/>
+          </a:xfrm>
+          <a:prstGeom prst="rightArrow">
+            <a:avLst/>
+          </a:prstGeom>
+          <a:solidFill>
+            <a:schemeClr val="bg1">
+              <a:lumMod val="85000"/>
+            </a:schemeClr>
+          </a:solidFill>
+          <a:ln>
+            <a:noFill/>
+          </a:ln>
+        </p:spPr>
+        <p:style>
+          <a:lnRef idx="2">
+            <a:schemeClr val="accent1">
+              <a:shade val="50000"/>
+            </a:schemeClr>
+          </a:lnRef>
+          <a:fillRef idx="1">
+            <a:schemeClr val="accent1"/>
+          </a:fillRef>
+          <a:effectRef idx="0">
+            <a:schemeClr val="accent1"/>
+          </a:effectRef>
+          <a:fontRef idx="minor">
+            <a:schemeClr val="lt1"/>
+          </a:fontRef>
+        </p:style>
+        <p:txBody>
+          <a:bodyPr rtlCol="0" anchor="ctr"/>
+          <a:lstStyle/>
+          <a:p>
+            <a:pPr algn="ctr"/>
+            <a:endParaRPr lang="en-US"/>
+          </a:p>
+        </p:txBody>
+      </p:sp>
+      <p:sp>
+        <p:nvSpPr>
+          <p:cNvPr id="19" name="Arrow: Bent-Up 18">
+            <a:extLst>
+              <a:ext uri="{FF2B5EF4-FFF2-40B4-BE49-F238E27FC236}">
+                <a16:creationId xmlns:a16="http://schemas.microsoft.com/office/drawing/2014/main" id="{4D1F094D-7D3F-42C2-8AB3-E0DE99D2F75E}"/>
+              </a:ext>
+            </a:extLst>
+          </p:cNvPr>
+          <p:cNvSpPr/>
+          <p:nvPr/>
+        </p:nvSpPr>
+        <p:spPr>
+          <a:xfrm flipH="1">
+            <a:off x="989043" y="4377441"/>
+            <a:ext cx="8195009" cy="1790094"/>
+          </a:xfrm>
+          <a:prstGeom prst="bentUpArrow">
+            <a:avLst>
+              <a:gd name="adj1" fmla="val 6854"/>
+              <a:gd name="adj2" fmla="val 13864"/>
+              <a:gd name="adj3" fmla="val 17573"/>
+            </a:avLst>
+          </a:prstGeom>
+          <a:solidFill>
+            <a:schemeClr val="bg1">
+              <a:lumMod val="85000"/>
+            </a:schemeClr>
+          </a:solidFill>
+          <a:ln>
+            <a:noFill/>
+          </a:ln>
+        </p:spPr>
+        <p:style>
+          <a:lnRef idx="2">
+            <a:schemeClr val="accent1">
+              <a:shade val="50000"/>
+            </a:schemeClr>
+          </a:lnRef>
+          <a:fillRef idx="1">
+            <a:schemeClr val="accent1"/>
+          </a:fillRef>
+          <a:effectRef idx="0">
+            <a:schemeClr val="accent1"/>
+          </a:effectRef>
+          <a:fontRef idx="minor">
+            <a:schemeClr val="lt1"/>
+          </a:fontRef>
+        </p:style>
+        <p:txBody>
+          <a:bodyPr rtlCol="0" anchor="ctr"/>
+          <a:lstStyle/>
+          <a:p>
+            <a:pPr algn="ctr"/>
+            <a:endParaRPr lang="en-US"/>
+          </a:p>
+        </p:txBody>
+      </p:sp>
+      <p:sp>
+        <p:nvSpPr>
+          <p:cNvPr id="21" name="TextBox 20">
+            <a:extLst>
+              <a:ext uri="{FF2B5EF4-FFF2-40B4-BE49-F238E27FC236}">
+                <a16:creationId xmlns:a16="http://schemas.microsoft.com/office/drawing/2014/main" id="{C9EF9A8E-8DC5-4159-9BF8-BB9EB0D47F1A}"/>
+              </a:ext>
+            </a:extLst>
+          </p:cNvPr>
+          <p:cNvSpPr txBox="1"/>
+          <p:nvPr/>
+        </p:nvSpPr>
+        <p:spPr>
+          <a:xfrm>
+            <a:off x="3382343" y="3171614"/>
+            <a:ext cx="884070" cy="369332"/>
+          </a:xfrm>
+          <a:prstGeom prst="rect">
+            <a:avLst/>
+          </a:prstGeom>
+          <a:noFill/>
+        </p:spPr>
+        <p:txBody>
+          <a:bodyPr wrap="square" rtlCol="0">
+            <a:spAutoFit/>
+          </a:bodyPr>
+          <a:lstStyle/>
+          <a:p>
+            <a:pPr algn="ctr"/>
+            <a:r>
+              <a:rPr lang="en-US" dirty="0"/>
+              <a:t>Action</a:t>
+            </a:r>
+          </a:p>
+        </p:txBody>
+      </p:sp>
+      <p:sp>
+        <p:nvSpPr>
+          <p:cNvPr id="22" name="TextBox 21">
+            <a:extLst>
+              <a:ext uri="{FF2B5EF4-FFF2-40B4-BE49-F238E27FC236}">
+                <a16:creationId xmlns:a16="http://schemas.microsoft.com/office/drawing/2014/main" id="{C6AC6EB0-4845-4B6D-A0EC-F59E2C840C92}"/>
+              </a:ext>
+            </a:extLst>
+          </p:cNvPr>
+          <p:cNvSpPr txBox="1"/>
+          <p:nvPr/>
+        </p:nvSpPr>
+        <p:spPr>
+          <a:xfrm>
+            <a:off x="3013786" y="1152802"/>
+            <a:ext cx="1548882" cy="369332"/>
+          </a:xfrm>
+          <a:prstGeom prst="rect">
+            <a:avLst/>
+          </a:prstGeom>
+          <a:noFill/>
+        </p:spPr>
+        <p:txBody>
+          <a:bodyPr wrap="square" rtlCol="0">
+            <a:spAutoFit/>
+          </a:bodyPr>
+          <a:lstStyle/>
+          <a:p>
+            <a:pPr algn="ctr"/>
+            <a:r>
+              <a:rPr lang="en-US" dirty="0"/>
+              <a:t>Server End API</a:t>
+            </a:r>
+          </a:p>
+        </p:txBody>
+      </p:sp>
+      <p:sp>
+        <p:nvSpPr>
+          <p:cNvPr id="23" name="TextBox 22">
+            <a:extLst>
+              <a:ext uri="{FF2B5EF4-FFF2-40B4-BE49-F238E27FC236}">
+                <a16:creationId xmlns:a16="http://schemas.microsoft.com/office/drawing/2014/main" id="{0A3589FA-C946-483E-BA7E-CF5B5490EECB}"/>
+              </a:ext>
+            </a:extLst>
+          </p:cNvPr>
+          <p:cNvSpPr txBox="1"/>
+          <p:nvPr/>
+        </p:nvSpPr>
+        <p:spPr>
+          <a:xfrm>
+            <a:off x="2004313" y="2022814"/>
+            <a:ext cx="1443914" cy="677108"/>
+          </a:xfrm>
+          <a:prstGeom prst="rect">
+            <a:avLst/>
+          </a:prstGeom>
+          <a:noFill/>
+        </p:spPr>
+        <p:txBody>
+          <a:bodyPr wrap="square" rtlCol="0">
+            <a:spAutoFit/>
+          </a:bodyPr>
+          <a:lstStyle/>
+          <a:p>
+            <a:r>
+              <a:rPr lang="en-US" sz="1400" dirty="0"/>
+              <a:t>Http Request:</a:t>
+            </a:r>
+          </a:p>
+          <a:p>
+            <a:r>
+              <a:rPr lang="en-US" sz="1200" dirty="0"/>
+              <a:t>- Sends Business object to be created</a:t>
+            </a:r>
+          </a:p>
+        </p:txBody>
+      </p:sp>
+      <p:sp>
+        <p:nvSpPr>
+          <p:cNvPr id="24" name="TextBox 23">
+            <a:extLst>
+              <a:ext uri="{FF2B5EF4-FFF2-40B4-BE49-F238E27FC236}">
+                <a16:creationId xmlns:a16="http://schemas.microsoft.com/office/drawing/2014/main" id="{AC001E4F-9B93-4F14-AE33-B724B8FB7DAE}"/>
+              </a:ext>
+            </a:extLst>
+          </p:cNvPr>
+          <p:cNvSpPr txBox="1"/>
+          <p:nvPr/>
+        </p:nvSpPr>
+        <p:spPr>
+          <a:xfrm>
+            <a:off x="4203436" y="2025764"/>
+            <a:ext cx="1363375" cy="677108"/>
+          </a:xfrm>
+          <a:prstGeom prst="rect">
+            <a:avLst/>
+          </a:prstGeom>
+          <a:noFill/>
+        </p:spPr>
+        <p:txBody>
+          <a:bodyPr wrap="square" rtlCol="0">
+            <a:spAutoFit/>
+          </a:bodyPr>
+          <a:lstStyle/>
+          <a:p>
+            <a:r>
+              <a:rPr lang="en-US" sz="1400" dirty="0"/>
+              <a:t>Response:</a:t>
+            </a:r>
+          </a:p>
+          <a:p>
+            <a:r>
+              <a:rPr lang="en-US" sz="1200" dirty="0"/>
+              <a:t>- Created Business</a:t>
+            </a:r>
+          </a:p>
+          <a:p>
+            <a:r>
+              <a:rPr lang="en-US" sz="1200" dirty="0"/>
+              <a:t>OR errors</a:t>
+            </a:r>
+          </a:p>
+        </p:txBody>
+      </p:sp>
+      <p:sp>
+        <p:nvSpPr>
+          <p:cNvPr id="25" name="TextBox 24">
+            <a:extLst>
+              <a:ext uri="{FF2B5EF4-FFF2-40B4-BE49-F238E27FC236}">
+                <a16:creationId xmlns:a16="http://schemas.microsoft.com/office/drawing/2014/main" id="{7A880AB0-2475-400F-B166-48AAD02CB66D}"/>
+              </a:ext>
+            </a:extLst>
+          </p:cNvPr>
+          <p:cNvSpPr txBox="1"/>
+          <p:nvPr/>
+        </p:nvSpPr>
+        <p:spPr>
+          <a:xfrm>
+            <a:off x="6488260" y="3437100"/>
+            <a:ext cx="845977" cy="369332"/>
+          </a:xfrm>
+          <a:prstGeom prst="rect">
+            <a:avLst/>
+          </a:prstGeom>
+          <a:noFill/>
+        </p:spPr>
+        <p:txBody>
+          <a:bodyPr wrap="square" rtlCol="0">
+            <a:spAutoFit/>
+          </a:bodyPr>
+          <a:lstStyle/>
+          <a:p>
+            <a:r>
+              <a:rPr lang="en-US" dirty="0"/>
+              <a:t>Errors?</a:t>
+            </a:r>
+          </a:p>
+        </p:txBody>
+      </p:sp>
+      <p:sp>
+        <p:nvSpPr>
+          <p:cNvPr id="26" name="TextBox 25">
+            <a:extLst>
+              <a:ext uri="{FF2B5EF4-FFF2-40B4-BE49-F238E27FC236}">
+                <a16:creationId xmlns:a16="http://schemas.microsoft.com/office/drawing/2014/main" id="{A4A3EC04-DD32-4B94-A128-C0F97EA7598F}"/>
+              </a:ext>
+            </a:extLst>
+          </p:cNvPr>
+          <p:cNvSpPr txBox="1"/>
+          <p:nvPr/>
+        </p:nvSpPr>
+        <p:spPr>
+          <a:xfrm>
+            <a:off x="6370468" y="2315201"/>
+            <a:ext cx="485192" cy="369332"/>
+          </a:xfrm>
+          <a:prstGeom prst="rect">
+            <a:avLst/>
+          </a:prstGeom>
+          <a:noFill/>
+        </p:spPr>
+        <p:txBody>
+          <a:bodyPr wrap="square" rtlCol="0">
+            <a:spAutoFit/>
+          </a:bodyPr>
+          <a:lstStyle/>
+          <a:p>
+            <a:r>
+              <a:rPr lang="en-US" dirty="0"/>
+              <a:t>No</a:t>
+            </a:r>
+          </a:p>
+        </p:txBody>
+      </p:sp>
+      <p:sp>
+        <p:nvSpPr>
+          <p:cNvPr id="27" name="TextBox 26">
+            <a:extLst>
+              <a:ext uri="{FF2B5EF4-FFF2-40B4-BE49-F238E27FC236}">
+                <a16:creationId xmlns:a16="http://schemas.microsoft.com/office/drawing/2014/main" id="{4F95E14F-7E71-4940-AE25-F503483DA52E}"/>
+              </a:ext>
+            </a:extLst>
+          </p:cNvPr>
+          <p:cNvSpPr txBox="1"/>
+          <p:nvPr/>
+        </p:nvSpPr>
+        <p:spPr>
+          <a:xfrm>
+            <a:off x="8412564" y="3220844"/>
+            <a:ext cx="536798" cy="369332"/>
+          </a:xfrm>
+          <a:prstGeom prst="rect">
+            <a:avLst/>
+          </a:prstGeom>
+          <a:noFill/>
+        </p:spPr>
+        <p:txBody>
+          <a:bodyPr wrap="square" rtlCol="0">
+            <a:spAutoFit/>
+          </a:bodyPr>
+          <a:lstStyle/>
+          <a:p>
+            <a:r>
+              <a:rPr lang="en-US" dirty="0"/>
+              <a:t>Yes</a:t>
+            </a:r>
+          </a:p>
+        </p:txBody>
+      </p:sp>
+      <p:sp>
+        <p:nvSpPr>
+          <p:cNvPr id="28" name="TextBox 27">
+            <a:extLst>
+              <a:ext uri="{FF2B5EF4-FFF2-40B4-BE49-F238E27FC236}">
+                <a16:creationId xmlns:a16="http://schemas.microsoft.com/office/drawing/2014/main" id="{40512C26-6030-427C-B3FF-B7CEB152DD3B}"/>
+              </a:ext>
+            </a:extLst>
+          </p:cNvPr>
+          <p:cNvSpPr txBox="1"/>
+          <p:nvPr/>
+        </p:nvSpPr>
+        <p:spPr>
+          <a:xfrm>
+            <a:off x="6929529" y="2345979"/>
+            <a:ext cx="1063378" cy="307777"/>
+          </a:xfrm>
+          <a:prstGeom prst="rect">
+            <a:avLst/>
+          </a:prstGeom>
+          <a:noFill/>
+        </p:spPr>
+        <p:txBody>
+          <a:bodyPr wrap="square" rtlCol="0">
+            <a:spAutoFit/>
+          </a:bodyPr>
+          <a:lstStyle/>
+          <a:p>
+            <a:r>
+              <a:rPr lang="en-US" sz="1400" dirty="0"/>
+              <a:t>Re-direct to</a:t>
+            </a:r>
+          </a:p>
+        </p:txBody>
+      </p:sp>
+      <p:sp>
+        <p:nvSpPr>
+          <p:cNvPr id="29" name="TextBox 28">
+            <a:extLst>
+              <a:ext uri="{FF2B5EF4-FFF2-40B4-BE49-F238E27FC236}">
+                <a16:creationId xmlns:a16="http://schemas.microsoft.com/office/drawing/2014/main" id="{8C26E07E-9C27-4B73-9FAA-9A40402AA581}"/>
+              </a:ext>
+            </a:extLst>
+          </p:cNvPr>
+          <p:cNvSpPr txBox="1"/>
+          <p:nvPr/>
+        </p:nvSpPr>
+        <p:spPr>
+          <a:xfrm>
+            <a:off x="4912241" y="3270375"/>
+            <a:ext cx="882393" cy="307777"/>
+          </a:xfrm>
+          <a:prstGeom prst="rect">
+            <a:avLst/>
+          </a:prstGeom>
+          <a:noFill/>
+        </p:spPr>
+        <p:txBody>
+          <a:bodyPr wrap="square" rtlCol="0">
+            <a:spAutoFit/>
+          </a:bodyPr>
+          <a:lstStyle/>
+          <a:p>
+            <a:pPr algn="ctr"/>
+            <a:r>
+              <a:rPr lang="en-US" sz="1400" dirty="0"/>
+              <a:t>Dispatch</a:t>
+            </a:r>
+          </a:p>
+        </p:txBody>
+      </p:sp>
+      <p:sp>
+        <p:nvSpPr>
+          <p:cNvPr id="30" name="TextBox 29">
+            <a:extLst>
+              <a:ext uri="{FF2B5EF4-FFF2-40B4-BE49-F238E27FC236}">
+                <a16:creationId xmlns:a16="http://schemas.microsoft.com/office/drawing/2014/main" id="{43692E11-336B-4A0F-93CD-AEEDD35C73E3}"/>
+              </a:ext>
+            </a:extLst>
+          </p:cNvPr>
+          <p:cNvSpPr txBox="1"/>
+          <p:nvPr/>
+        </p:nvSpPr>
+        <p:spPr>
+          <a:xfrm>
+            <a:off x="6112716" y="1036307"/>
+            <a:ext cx="1537218" cy="677108"/>
+          </a:xfrm>
+          <a:prstGeom prst="rect">
+            <a:avLst/>
+          </a:prstGeom>
+          <a:noFill/>
+        </p:spPr>
+        <p:txBody>
+          <a:bodyPr wrap="square" rtlCol="0">
+            <a:spAutoFit/>
+          </a:bodyPr>
+          <a:lstStyle/>
+          <a:p>
+            <a:pPr algn="ctr"/>
+            <a:r>
+              <a:rPr lang="en-US" sz="1600" dirty="0"/>
+              <a:t>Dashboard</a:t>
+            </a:r>
+          </a:p>
+          <a:p>
+            <a:pPr algn="ctr"/>
+            <a:endParaRPr lang="en-US" sz="700" dirty="0"/>
+          </a:p>
+          <a:p>
+            <a:pPr algn="ctr"/>
+            <a:r>
+              <a:rPr lang="en-US" sz="1400" dirty="0"/>
+              <a:t>React component</a:t>
+            </a:r>
+          </a:p>
+        </p:txBody>
+      </p:sp>
+      <p:sp>
+        <p:nvSpPr>
+          <p:cNvPr id="31" name="TextBox 30">
+            <a:extLst>
+              <a:ext uri="{FF2B5EF4-FFF2-40B4-BE49-F238E27FC236}">
+                <a16:creationId xmlns:a16="http://schemas.microsoft.com/office/drawing/2014/main" id="{9086A4A6-3B91-4326-9CAA-9644575A4521}"/>
+              </a:ext>
+            </a:extLst>
+          </p:cNvPr>
+          <p:cNvSpPr txBox="1"/>
+          <p:nvPr/>
+        </p:nvSpPr>
+        <p:spPr>
+          <a:xfrm>
+            <a:off x="9458928" y="2559932"/>
+            <a:ext cx="1380351" cy="338554"/>
+          </a:xfrm>
+          <a:prstGeom prst="rect">
+            <a:avLst/>
+          </a:prstGeom>
+          <a:noFill/>
+        </p:spPr>
+        <p:txBody>
+          <a:bodyPr wrap="square" rtlCol="0">
+            <a:spAutoFit/>
+          </a:bodyPr>
+          <a:lstStyle/>
+          <a:p>
+            <a:pPr algn="ctr"/>
+            <a:r>
+              <a:rPr lang="en-US" sz="1600" dirty="0"/>
+              <a:t>Error Reducer</a:t>
+            </a:r>
+          </a:p>
+        </p:txBody>
+      </p:sp>
+      <p:sp>
+        <p:nvSpPr>
+          <p:cNvPr id="32" name="TextBox 31">
+            <a:extLst>
+              <a:ext uri="{FF2B5EF4-FFF2-40B4-BE49-F238E27FC236}">
+                <a16:creationId xmlns:a16="http://schemas.microsoft.com/office/drawing/2014/main" id="{FE372542-7AFF-4688-9264-CFD7C753D481}"/>
+              </a:ext>
+            </a:extLst>
+          </p:cNvPr>
+          <p:cNvSpPr txBox="1"/>
+          <p:nvPr/>
+        </p:nvSpPr>
+        <p:spPr>
+          <a:xfrm>
+            <a:off x="3264529" y="3549951"/>
+            <a:ext cx="1256273" cy="523220"/>
+          </a:xfrm>
+          <a:prstGeom prst="rect">
+            <a:avLst/>
+          </a:prstGeom>
+          <a:noFill/>
+        </p:spPr>
+        <p:txBody>
+          <a:bodyPr wrap="square" rtlCol="0">
+            <a:spAutoFit/>
+          </a:bodyPr>
+          <a:lstStyle/>
+          <a:p>
+            <a:r>
+              <a:rPr lang="en-US" sz="1400" dirty="0"/>
+              <a:t>type: *** </a:t>
+            </a:r>
+          </a:p>
+          <a:p>
+            <a:r>
+              <a:rPr lang="en-US" sz="1400" dirty="0"/>
+              <a:t>payload: ***</a:t>
+            </a:r>
+          </a:p>
+        </p:txBody>
+      </p:sp>
+      <p:sp>
+        <p:nvSpPr>
+          <p:cNvPr id="33" name="TextBox 32">
+            <a:extLst>
+              <a:ext uri="{FF2B5EF4-FFF2-40B4-BE49-F238E27FC236}">
+                <a16:creationId xmlns:a16="http://schemas.microsoft.com/office/drawing/2014/main" id="{14B2FBA6-BE4F-4E16-BC27-E72B311EC577}"/>
+              </a:ext>
+            </a:extLst>
+          </p:cNvPr>
+          <p:cNvSpPr txBox="1"/>
+          <p:nvPr/>
+        </p:nvSpPr>
+        <p:spPr>
+          <a:xfrm>
+            <a:off x="9784313" y="4806700"/>
+            <a:ext cx="1537218" cy="338554"/>
+          </a:xfrm>
+          <a:prstGeom prst="rect">
+            <a:avLst/>
+          </a:prstGeom>
+          <a:noFill/>
+        </p:spPr>
+        <p:txBody>
+          <a:bodyPr wrap="square" rtlCol="0">
+            <a:spAutoFit/>
+          </a:bodyPr>
+          <a:lstStyle/>
+          <a:p>
+            <a:pPr algn="ctr"/>
+            <a:r>
+              <a:rPr lang="en-US" sz="1600" dirty="0"/>
+              <a:t>Redux Store</a:t>
+            </a:r>
+          </a:p>
+        </p:txBody>
+      </p:sp>
+      <p:sp>
+        <p:nvSpPr>
+          <p:cNvPr id="34" name="TextBox 33">
+            <a:extLst>
+              <a:ext uri="{FF2B5EF4-FFF2-40B4-BE49-F238E27FC236}">
+                <a16:creationId xmlns:a16="http://schemas.microsoft.com/office/drawing/2014/main" id="{2ACD0D3F-4EC2-42B4-9A54-9B28A7232456}"/>
+              </a:ext>
+            </a:extLst>
+          </p:cNvPr>
+          <p:cNvSpPr txBox="1"/>
+          <p:nvPr/>
+        </p:nvSpPr>
+        <p:spPr>
+          <a:xfrm>
+            <a:off x="9935308" y="5328634"/>
+            <a:ext cx="1286318" cy="954107"/>
+          </a:xfrm>
+          <a:prstGeom prst="rect">
+            <a:avLst/>
+          </a:prstGeom>
+          <a:noFill/>
+        </p:spPr>
+        <p:txBody>
+          <a:bodyPr wrap="square" rtlCol="0">
+            <a:spAutoFit/>
+          </a:bodyPr>
+          <a:lstStyle/>
+          <a:p>
+            <a:r>
+              <a:rPr lang="en-US" sz="1400" dirty="0"/>
+              <a:t>Businesses {…}</a:t>
+            </a:r>
+          </a:p>
+          <a:p>
+            <a:r>
+              <a:rPr lang="en-US" sz="1400" dirty="0"/>
+              <a:t>Business {…}</a:t>
+            </a:r>
+          </a:p>
+          <a:p>
+            <a:r>
+              <a:rPr lang="en-US" sz="1400" dirty="0"/>
+              <a:t>User {…}</a:t>
+            </a:r>
+          </a:p>
+          <a:p>
+            <a:r>
+              <a:rPr lang="en-US" sz="1400" dirty="0"/>
+              <a:t>Errors {…}</a:t>
+            </a:r>
+          </a:p>
+        </p:txBody>
+      </p:sp>
+      <p:sp>
+        <p:nvSpPr>
+          <p:cNvPr id="35" name="TextBox 34">
+            <a:extLst>
+              <a:ext uri="{FF2B5EF4-FFF2-40B4-BE49-F238E27FC236}">
+                <a16:creationId xmlns:a16="http://schemas.microsoft.com/office/drawing/2014/main" id="{13395FD6-984B-4895-AA8D-AFE327DAD386}"/>
+              </a:ext>
+            </a:extLst>
+          </p:cNvPr>
+          <p:cNvSpPr txBox="1"/>
+          <p:nvPr/>
+        </p:nvSpPr>
+        <p:spPr>
+          <a:xfrm>
+            <a:off x="2995137" y="5056996"/>
+            <a:ext cx="3776558" cy="1200329"/>
+          </a:xfrm>
+          <a:prstGeom prst="rect">
+            <a:avLst/>
+          </a:prstGeom>
+          <a:noFill/>
+        </p:spPr>
+        <p:txBody>
+          <a:bodyPr wrap="square" rtlCol="0">
+            <a:spAutoFit/>
+          </a:bodyPr>
+          <a:lstStyle/>
+          <a:p>
+            <a:r>
+              <a:rPr lang="en-US" sz="1600" dirty="0"/>
+              <a:t>Post errors to Create Form, which will: </a:t>
+            </a:r>
+          </a:p>
+          <a:p>
+            <a:r>
+              <a:rPr lang="en-US" sz="1400" dirty="0"/>
+              <a:t>    - Connect to store</a:t>
+            </a:r>
+          </a:p>
+          <a:p>
+            <a:r>
+              <a:rPr lang="en-US" sz="1400" dirty="0"/>
+              <a:t>    - Get updated state and map it to props</a:t>
+            </a:r>
+          </a:p>
+          <a:p>
+            <a:r>
+              <a:rPr lang="en-US" sz="1400" dirty="0"/>
+              <a:t>    - Receive new props and set state</a:t>
+            </a:r>
+          </a:p>
+          <a:p>
+            <a:r>
+              <a:rPr lang="en-US" sz="1400" dirty="0"/>
+              <a:t>    - Display errors</a:t>
+            </a:r>
+          </a:p>
+        </p:txBody>
+      </p:sp>
+      <p:sp>
+        <p:nvSpPr>
+          <p:cNvPr id="36" name="TextBox 35">
+            <a:extLst>
+              <a:ext uri="{FF2B5EF4-FFF2-40B4-BE49-F238E27FC236}">
+                <a16:creationId xmlns:a16="http://schemas.microsoft.com/office/drawing/2014/main" id="{7EB25634-5DD9-4122-84F9-ED91EA5E1722}"/>
+              </a:ext>
+            </a:extLst>
+          </p:cNvPr>
+          <p:cNvSpPr txBox="1"/>
+          <p:nvPr/>
+        </p:nvSpPr>
+        <p:spPr>
+          <a:xfrm>
+            <a:off x="10144483" y="3707572"/>
+            <a:ext cx="816878" cy="523220"/>
+          </a:xfrm>
+          <a:prstGeom prst="rect">
+            <a:avLst/>
+          </a:prstGeom>
+          <a:noFill/>
+        </p:spPr>
+        <p:txBody>
+          <a:bodyPr wrap="square" rtlCol="0">
+            <a:spAutoFit/>
+          </a:bodyPr>
+          <a:lstStyle/>
+          <a:p>
+            <a:pPr algn="ctr"/>
+            <a:r>
+              <a:rPr lang="en-US" sz="1400" dirty="0"/>
+              <a:t>Updates</a:t>
+            </a:r>
+          </a:p>
+          <a:p>
+            <a:pPr algn="ctr"/>
+            <a:r>
+              <a:rPr lang="en-US" sz="1400" dirty="0"/>
+              <a:t>Store</a:t>
             </a:r>
           </a:p>
         </p:txBody>

</xml_diff>